<commit_message>
add login,remove index,index change to home
</commit_message>
<xml_diff>
--- a/后台文档/后台移动端界面.pptx
+++ b/后台文档/后台移动端界面.pptx
@@ -11,6 +11,7 @@
     <p:sldId id="260" r:id="rId6"/>
     <p:sldId id="261" r:id="rId7"/>
     <p:sldId id="262" r:id="rId8"/>
+    <p:sldId id="263" r:id="rId9"/>
   </p:sldIdLst>
   <p:sldSz cx="12192000" cy="6858000"/>
   <p:notesSz cx="6858000" cy="9144000"/>
@@ -13738,6 +13739,80 @@
 </p:sld>
 </file>
 
+<file path=ppt/slides/slide7.xml><?xml version="1.0" encoding="utf-8"?>
+<p:sld xmlns:a="http://schemas.openxmlformats.org/drawingml/2006/main" xmlns:r="http://schemas.openxmlformats.org/officeDocument/2006/relationships" xmlns:p="http://schemas.openxmlformats.org/presentationml/2006/main">
+  <p:cSld>
+    <p:spTree>
+      <p:nvGrpSpPr>
+        <p:cNvPr id="1" name=""/>
+        <p:cNvGrpSpPr/>
+        <p:nvPr/>
+      </p:nvGrpSpPr>
+      <p:grpSpPr/>
+      <p:sp>
+        <p:nvSpPr>
+          <p:cNvPr id="33" name="文本框 32"/>
+          <p:cNvSpPr txBox="1"/>
+          <p:nvPr/>
+        </p:nvSpPr>
+        <p:spPr>
+          <a:xfrm>
+            <a:off x="812800" y="647065"/>
+            <a:ext cx="1097280" cy="368300"/>
+          </a:xfrm>
+          <a:prstGeom prst="rect">
+            <a:avLst/>
+          </a:prstGeom>
+          <a:noFill/>
+        </p:spPr>
+        <p:txBody>
+          <a:bodyPr wrap="none" rtlCol="0">
+            <a:spAutoFit/>
+          </a:bodyPr>
+          <a:p>
+            <a:pPr algn="l"/>
+            <a:r>
+              <a:rPr lang="zh-CN" altLang="en-US">
+                <a:sym typeface="+mn-ea"/>
+              </a:rPr>
+              <a:t>创建订单</a:t>
+            </a:r>
+            <a:endParaRPr lang="zh-CN" altLang="en-US"/>
+          </a:p>
+        </p:txBody>
+      </p:sp>
+      <p:pic>
+        <p:nvPicPr>
+          <p:cNvPr id="2" name="图片 1" descr="770b0a7785d3e439cf84ab128c965e9"/>
+          <p:cNvPicPr>
+            <a:picLocks noChangeAspect="1"/>
+          </p:cNvPicPr>
+          <p:nvPr/>
+        </p:nvPicPr>
+        <p:blipFill>
+          <a:blip r:embed="rId1"/>
+          <a:stretch>
+            <a:fillRect/>
+          </a:stretch>
+        </p:blipFill>
+        <p:spPr>
+          <a:xfrm>
+            <a:off x="4244340" y="96520"/>
+            <a:ext cx="3159760" cy="6531610"/>
+          </a:xfrm>
+          <a:prstGeom prst="rect">
+            <a:avLst/>
+          </a:prstGeom>
+        </p:spPr>
+      </p:pic>
+    </p:spTree>
+  </p:cSld>
+  <p:clrMapOvr>
+    <a:masterClrMapping/>
+  </p:clrMapOvr>
+</p:sld>
+</file>
+
 <file path=ppt/theme/theme1.xml><?xml version="1.0" encoding="utf-8"?>
 <a:theme xmlns:a="http://schemas.openxmlformats.org/drawingml/2006/main" name="Office 主题">
   <a:themeElements>

</xml_diff>